<commit_message>
Se adjuntan objetivos y conclusion
</commit_message>
<xml_diff>
--- a/Proyecto módulo 1.pptx
+++ b/Proyecto módulo 1.pptx
@@ -110,7 +110,16 @@
       </a:defRPr>
     </a:lvl9pPr>
   </p:defaultTextStyle>
+  <p:extLst>
+    <p:ext uri="{EFAFB233-063F-42B5-8137-9DF3F51BA10A}">
+      <p15:sldGuideLst xmlns:p15="http://schemas.microsoft.com/office/powerpoint/2012/main"/>
+    </p:ext>
+  </p:extLst>
 </p:presentation>
+</file>
+
+<file path=ppt/revisionInfo.xml><?xml version="1.0" encoding="utf-8"?>
+<p1510:revInfo xmlns:a="http://schemas.openxmlformats.org/drawingml/2006/main" xmlns:r="http://schemas.openxmlformats.org/officeDocument/2006/relationships" xmlns:p1510="http://schemas.microsoft.com/office/powerpoint/2015/10/main"/>
 </file>
 
 <file path=ppt/slideLayouts/slideLayout1.xml><?xml version="1.0" encoding="utf-8"?>
@@ -326,7 +335,7 @@
           <a:p>
             <a:fld id="{FD289CDF-2F97-4BAB-8D78-9050FD94C3C8}" type="datetimeFigureOut">
               <a:rPr lang="es-MX" smtClean="0"/>
-              <a:t>25/09/2017</a:t>
+              <a:t>26/09/2017</a:t>
             </a:fld>
             <a:endParaRPr lang="es-MX"/>
           </a:p>
@@ -617,7 +626,7 @@
           <a:p>
             <a:fld id="{FD289CDF-2F97-4BAB-8D78-9050FD94C3C8}" type="datetimeFigureOut">
               <a:rPr lang="es-MX" smtClean="0"/>
-              <a:t>25/09/2017</a:t>
+              <a:t>26/09/2017</a:t>
             </a:fld>
             <a:endParaRPr lang="es-MX"/>
           </a:p>
@@ -876,7 +885,7 @@
           <a:p>
             <a:fld id="{FD289CDF-2F97-4BAB-8D78-9050FD94C3C8}" type="datetimeFigureOut">
               <a:rPr lang="es-MX" smtClean="0"/>
-              <a:t>25/09/2017</a:t>
+              <a:t>26/09/2017</a:t>
             </a:fld>
             <a:endParaRPr lang="es-MX"/>
           </a:p>
@@ -1345,7 +1354,7 @@
           <a:p>
             <a:fld id="{FD289CDF-2F97-4BAB-8D78-9050FD94C3C8}" type="datetimeFigureOut">
               <a:rPr lang="es-MX" smtClean="0"/>
-              <a:t>25/09/2017</a:t>
+              <a:t>26/09/2017</a:t>
             </a:fld>
             <a:endParaRPr lang="es-MX"/>
           </a:p>
@@ -1525,7 +1534,7 @@
           <a:p>
             <a:fld id="{FD289CDF-2F97-4BAB-8D78-9050FD94C3C8}" type="datetimeFigureOut">
               <a:rPr lang="es-MX" smtClean="0"/>
-              <a:t>25/09/2017</a:t>
+              <a:t>26/09/2017</a:t>
             </a:fld>
             <a:endParaRPr lang="es-MX"/>
           </a:p>
@@ -2101,7 +2110,7 @@
           <a:p>
             <a:fld id="{FD289CDF-2F97-4BAB-8D78-9050FD94C3C8}" type="datetimeFigureOut">
               <a:rPr lang="es-MX" smtClean="0"/>
-              <a:t>25/09/2017</a:t>
+              <a:t>26/09/2017</a:t>
             </a:fld>
             <a:endParaRPr lang="es-MX"/>
           </a:p>
@@ -2433,7 +2442,7 @@
           <a:p>
             <a:fld id="{FD289CDF-2F97-4BAB-8D78-9050FD94C3C8}" type="datetimeFigureOut">
               <a:rPr lang="es-MX" smtClean="0"/>
-              <a:t>25/09/2017</a:t>
+              <a:t>26/09/2017</a:t>
             </a:fld>
             <a:endParaRPr lang="es-MX"/>
           </a:p>
@@ -2608,7 +2617,7 @@
           <a:p>
             <a:fld id="{FD289CDF-2F97-4BAB-8D78-9050FD94C3C8}" type="datetimeFigureOut">
               <a:rPr lang="es-MX" smtClean="0"/>
-              <a:t>25/09/2017</a:t>
+              <a:t>26/09/2017</a:t>
             </a:fld>
             <a:endParaRPr lang="es-MX"/>
           </a:p>
@@ -2788,7 +2797,7 @@
           <a:p>
             <a:fld id="{FD289CDF-2F97-4BAB-8D78-9050FD94C3C8}" type="datetimeFigureOut">
               <a:rPr lang="es-MX" smtClean="0"/>
-              <a:t>25/09/2017</a:t>
+              <a:t>26/09/2017</a:t>
             </a:fld>
             <a:endParaRPr lang="es-MX"/>
           </a:p>
@@ -2958,7 +2967,7 @@
           <a:p>
             <a:fld id="{FD289CDF-2F97-4BAB-8D78-9050FD94C3C8}" type="datetimeFigureOut">
               <a:rPr lang="es-MX" smtClean="0"/>
-              <a:t>25/09/2017</a:t>
+              <a:t>26/09/2017</a:t>
             </a:fld>
             <a:endParaRPr lang="es-MX"/>
           </a:p>
@@ -3215,7 +3224,7 @@
           <a:p>
             <a:fld id="{FD289CDF-2F97-4BAB-8D78-9050FD94C3C8}" type="datetimeFigureOut">
               <a:rPr lang="es-MX" smtClean="0"/>
-              <a:t>25/09/2017</a:t>
+              <a:t>26/09/2017</a:t>
             </a:fld>
             <a:endParaRPr lang="es-MX"/>
           </a:p>
@@ -3507,7 +3516,7 @@
           <a:p>
             <a:fld id="{FD289CDF-2F97-4BAB-8D78-9050FD94C3C8}" type="datetimeFigureOut">
               <a:rPr lang="es-MX" smtClean="0"/>
-              <a:t>25/09/2017</a:t>
+              <a:t>26/09/2017</a:t>
             </a:fld>
             <a:endParaRPr lang="es-MX"/>
           </a:p>
@@ -3937,7 +3946,7 @@
           <a:p>
             <a:fld id="{FD289CDF-2F97-4BAB-8D78-9050FD94C3C8}" type="datetimeFigureOut">
               <a:rPr lang="es-MX" smtClean="0"/>
-              <a:t>25/09/2017</a:t>
+              <a:t>26/09/2017</a:t>
             </a:fld>
             <a:endParaRPr lang="es-MX"/>
           </a:p>
@@ -4055,7 +4064,7 @@
           <a:p>
             <a:fld id="{FD289CDF-2F97-4BAB-8D78-9050FD94C3C8}" type="datetimeFigureOut">
               <a:rPr lang="es-MX" smtClean="0"/>
-              <a:t>25/09/2017</a:t>
+              <a:t>26/09/2017</a:t>
             </a:fld>
             <a:endParaRPr lang="es-MX"/>
           </a:p>
@@ -4150,7 +4159,7 @@
           <a:p>
             <a:fld id="{FD289CDF-2F97-4BAB-8D78-9050FD94C3C8}" type="datetimeFigureOut">
               <a:rPr lang="es-MX" smtClean="0"/>
-              <a:t>25/09/2017</a:t>
+              <a:t>26/09/2017</a:t>
             </a:fld>
             <a:endParaRPr lang="es-MX"/>
           </a:p>
@@ -4433,7 +4442,7 @@
           <a:p>
             <a:fld id="{FD289CDF-2F97-4BAB-8D78-9050FD94C3C8}" type="datetimeFigureOut">
               <a:rPr lang="es-MX" smtClean="0"/>
-              <a:t>25/09/2017</a:t>
+              <a:t>26/09/2017</a:t>
             </a:fld>
             <a:endParaRPr lang="es-MX"/>
           </a:p>
@@ -4724,7 +4733,7 @@
           <a:p>
             <a:fld id="{FD289CDF-2F97-4BAB-8D78-9050FD94C3C8}" type="datetimeFigureOut">
               <a:rPr lang="es-MX" smtClean="0"/>
-              <a:t>25/09/2017</a:t>
+              <a:t>26/09/2017</a:t>
             </a:fld>
             <a:endParaRPr lang="es-MX"/>
           </a:p>
@@ -4955,7 +4964,7 @@
           <a:p>
             <a:fld id="{FD289CDF-2F97-4BAB-8D78-9050FD94C3C8}" type="datetimeFigureOut">
               <a:rPr lang="es-MX" smtClean="0"/>
-              <a:t>25/09/2017</a:t>
+              <a:t>26/09/2017</a:t>
             </a:fld>
             <a:endParaRPr lang="es-MX"/>
           </a:p>
@@ -5931,24 +5940,61 @@
         </p:nvSpPr>
         <p:spPr/>
         <p:txBody>
-          <a:bodyPr/>
+          <a:bodyPr>
+            <a:normAutofit lnSpcReduction="10000"/>
+          </a:bodyPr>
           <a:lstStyle/>
           <a:p>
             <a:r>
               <a:rPr lang="es-MX" dirty="0"/>
-              <a:t>Objetivo general:</a:t>
-            </a:r>
-          </a:p>
-          <a:p>
+              <a:t>Objetivo general: </a:t>
+            </a:r>
+            <a:r>
+              <a:rPr lang="es-ES" dirty="0"/>
+              <a:t>objetivo principal reside en fomentar la aplicación de la tecnología y la ciencia en beneficio de todos los hombres y de todas las sociedades del mundo.</a:t>
+            </a:r>
             <a:endParaRPr lang="es-MX" dirty="0"/>
           </a:p>
           <a:p>
+            <a:endParaRPr lang="es-MX" dirty="0"/>
+          </a:p>
+          <a:p>
             <a:r>
               <a:rPr lang="es-MX" dirty="0"/>
-              <a:t>Objetivo específico:</a:t>
-            </a:r>
-          </a:p>
-          <a:p>
+              <a:t>Objetivo específico: </a:t>
+            </a:r>
+            <a:r>
+              <a:rPr lang="es-ES" dirty="0"/>
+              <a:t>presentar y profundizar en las aplicaciones que darán resolución a las problemáticas constructivas y urbanas, y permitir así la seguridad y la integridad física, la cual debe garantizarse a todas las personas por igual; utilizando el código </a:t>
+            </a:r>
+            <a:r>
+              <a:rPr lang="es-ES" dirty="0" err="1"/>
+              <a:t>python</a:t>
+            </a:r>
+            <a:r>
+              <a:rPr lang="es-ES" dirty="0"/>
+              <a:t> mediante la plataforma </a:t>
+            </a:r>
+            <a:r>
+              <a:rPr lang="es-ES" dirty="0" err="1"/>
+              <a:t>Jupyter</a:t>
+            </a:r>
+            <a:r>
+              <a:rPr lang="es-ES" dirty="0"/>
+              <a:t> para resolver una problemática común en el ámbito de la </a:t>
+            </a:r>
+            <a:r>
+              <a:rPr lang="es-ES" dirty="0" err="1"/>
+              <a:t>ingenieria</a:t>
+            </a:r>
+            <a:r>
+              <a:rPr lang="es-ES" dirty="0"/>
+              <a:t> civil, el cual consiste en el análisis estructural mediante el momento </a:t>
+            </a:r>
+            <a:r>
+              <a:rPr lang="es-ES" dirty="0" err="1"/>
+              <a:t>flexionante</a:t>
+            </a:r>
             <a:endParaRPr lang="es-MX" dirty="0"/>
           </a:p>
         </p:txBody>
@@ -6381,7 +6427,29 @@
           <a:bodyPr/>
           <a:lstStyle/>
           <a:p>
-            <a:endParaRPr lang="es-MX" dirty="0"/>
+            <a:pPr marL="0" indent="0">
+              <a:buNone/>
+            </a:pPr>
+            <a:r>
+              <a:rPr lang="es-MX" dirty="0"/>
+              <a:t>Después de realizar el presente proyecto podemos retomar la importancia de la implementación de las herramientas para modelar los fenómenos físicos para su mejor análisis y una correcta interpretación. Podemos analizar visualmente a través de la </a:t>
+            </a:r>
+            <a:r>
+              <a:rPr lang="es-MX" dirty="0" err="1"/>
+              <a:t>graficación</a:t>
+            </a:r>
+            <a:r>
+              <a:rPr lang="es-MX" dirty="0"/>
+              <a:t> de la pendiente y la deflexión del elemento estructural analizado, damos constancia del correcto funcionamiento del elemento, comportándose de la manera esperada adecuándose a la curvatura de elasticidad producto del momento </a:t>
+            </a:r>
+            <a:r>
+              <a:rPr lang="es-MX" dirty="0" err="1"/>
+              <a:t>flexionante</a:t>
+            </a:r>
+            <a:r>
+              <a:rPr lang="es-MX" dirty="0"/>
+              <a:t>.</a:t>
+            </a:r>
           </a:p>
         </p:txBody>
       </p:sp>

</xml_diff>